<commit_message>
Update Presentation Microsoft Azure.pptx
</commit_message>
<xml_diff>
--- a/Presentation Microsoft Azure.pptx
+++ b/Presentation Microsoft Azure.pptx
@@ -5,10 +5,10 @@
     <p:sldMasterId id="2147483648" r:id="rId1"/>
   </p:sldMasterIdLst>
   <p:notesMasterIdLst>
-    <p:notesMasterId r:id="rId14"/>
+    <p:notesMasterId r:id="rId16"/>
   </p:notesMasterIdLst>
   <p:handoutMasterIdLst>
-    <p:handoutMasterId r:id="rId15"/>
+    <p:handoutMasterId r:id="rId17"/>
   </p:handoutMasterIdLst>
   <p:sldIdLst>
     <p:sldId id="493" r:id="rId2"/>
@@ -22,7 +22,9 @@
     <p:sldId id="732" r:id="rId10"/>
     <p:sldId id="733" r:id="rId11"/>
     <p:sldId id="731" r:id="rId12"/>
-    <p:sldId id="729" r:id="rId13"/>
+    <p:sldId id="740" r:id="rId13"/>
+    <p:sldId id="741" r:id="rId14"/>
+    <p:sldId id="729" r:id="rId15"/>
   </p:sldIdLst>
   <p:sldSz cx="12192000" cy="6858000"/>
   <p:notesSz cx="9928225" cy="6797675"/>
@@ -147,6 +149,12 @@
             <p14:sldId id="731"/>
           </p14:sldIdLst>
         </p14:section>
+        <p14:section name="Application Insights" id="{F74154DD-969B-4292-A3C9-32629DC8EAB7}">
+          <p14:sldIdLst>
+            <p14:sldId id="740"/>
+            <p14:sldId id="741"/>
+          </p14:sldIdLst>
+        </p14:section>
         <p14:section name="Questions" id="{0F2455EB-8F6C-4884-BF91-95D0C53C532B}">
           <p14:sldIdLst>
             <p14:sldId id="729"/>
@@ -173,10 +181,6 @@
     </p:ext>
   </p:extLst>
 </p:presentation>
-</file>
-
-<file path=ppt/revisionInfo.xml><?xml version="1.0" encoding="utf-8"?>
-<p1510:revInfo xmlns:a="http://schemas.openxmlformats.org/drawingml/2006/main" xmlns:r="http://schemas.openxmlformats.org/officeDocument/2006/relationships" xmlns:p1510="http://schemas.microsoft.com/office/powerpoint/2015/10/main"/>
 </file>
 
 <file path=ppt/handoutMasters/handoutMaster1.xml><?xml version="1.0" encoding="utf-8"?>
@@ -261,7 +265,7 @@
           <a:p>
             <a:fld id="{CD54E0B9-A397-428E-BA01-CD7A34B572EB}" type="datetimeFigureOut">
               <a:rPr lang="en-US" smtClean="0"/>
-              <a:t>13-Jun-17</a:t>
+              <a:t>5/22/2021</a:t>
             </a:fld>
             <a:endParaRPr lang="en-US"/>
           </a:p>
@@ -426,7 +430,7 @@
           <a:p>
             <a:fld id="{AA161301-18C9-4CA0-A0BF-791B6E0DDD4D}" type="datetimeFigureOut">
               <a:rPr lang="en-GB" smtClean="0"/>
-              <a:t>13/06/2017</a:t>
+              <a:t>22/05/2021</a:t>
             </a:fld>
             <a:endParaRPr lang="en-GB"/>
           </a:p>
@@ -11686,6 +11690,238 @@
       </p:grpSpPr>
       <p:sp>
         <p:nvSpPr>
+          <p:cNvPr id="5" name="Title 4">
+            <a:extLst>
+              <a:ext uri="{FF2B5EF4-FFF2-40B4-BE49-F238E27FC236}">
+                <a16:creationId xmlns:a16="http://schemas.microsoft.com/office/drawing/2014/main" id="{E664BEE2-848C-4071-82F8-1286856BB9DC}"/>
+              </a:ext>
+            </a:extLst>
+          </p:cNvPr>
+          <p:cNvSpPr>
+            <a:spLocks noGrp="1"/>
+          </p:cNvSpPr>
+          <p:nvPr>
+            <p:ph type="title"/>
+          </p:nvPr>
+        </p:nvSpPr>
+        <p:spPr/>
+        <p:txBody>
+          <a:bodyPr/>
+          <a:lstStyle/>
+          <a:p>
+            <a:r>
+              <a:rPr lang="en-US" dirty="0"/>
+              <a:t>Application Insights</a:t>
+            </a:r>
+            <a:endParaRPr lang="ro-RO" dirty="0"/>
+          </a:p>
+        </p:txBody>
+      </p:sp>
+    </p:spTree>
+    <p:extLst>
+      <p:ext uri="{BB962C8B-B14F-4D97-AF65-F5344CB8AC3E}">
+        <p14:creationId xmlns:p14="http://schemas.microsoft.com/office/powerpoint/2010/main" val="416516387"/>
+      </p:ext>
+    </p:extLst>
+  </p:cSld>
+  <p:clrMapOvr>
+    <a:masterClrMapping/>
+  </p:clrMapOvr>
+  <mc:AlternateContent xmlns:mc="http://schemas.openxmlformats.org/markup-compatibility/2006" xmlns:p14="http://schemas.microsoft.com/office/powerpoint/2010/main">
+    <mc:Choice Requires="p14">
+      <p:transition spd="med" p14:dur="700" advClick="0" advTm="1500">
+        <p:fade/>
+      </p:transition>
+    </mc:Choice>
+    <mc:Fallback xmlns="">
+      <p:transition spd="med" advClick="0" advTm="1500">
+        <p:fade/>
+      </p:transition>
+    </mc:Fallback>
+  </mc:AlternateContent>
+</p:sld>
+</file>
+
+<file path=ppt/slides/slide13.xml><?xml version="1.0" encoding="utf-8"?>
+<p:sld xmlns:a="http://schemas.openxmlformats.org/drawingml/2006/main" xmlns:r="http://schemas.openxmlformats.org/officeDocument/2006/relationships" xmlns:p="http://schemas.openxmlformats.org/presentationml/2006/main">
+  <p:cSld>
+    <p:spTree>
+      <p:nvGrpSpPr>
+        <p:cNvPr id="1" name=""/>
+        <p:cNvGrpSpPr/>
+        <p:nvPr/>
+      </p:nvGrpSpPr>
+      <p:grpSpPr>
+        <a:xfrm>
+          <a:off x="0" y="0"/>
+          <a:ext cx="0" cy="0"/>
+          <a:chOff x="0" y="0"/>
+          <a:chExt cx="0" cy="0"/>
+        </a:xfrm>
+      </p:grpSpPr>
+      <p:sp>
+        <p:nvSpPr>
+          <p:cNvPr id="3" name="Title 2">
+            <a:extLst>
+              <a:ext uri="{FF2B5EF4-FFF2-40B4-BE49-F238E27FC236}">
+                <a16:creationId xmlns:a16="http://schemas.microsoft.com/office/drawing/2014/main" id="{B526709A-54BC-4213-A8BA-B090515D9BF4}"/>
+              </a:ext>
+            </a:extLst>
+          </p:cNvPr>
+          <p:cNvSpPr>
+            <a:spLocks noGrp="1"/>
+          </p:cNvSpPr>
+          <p:nvPr>
+            <p:ph type="title"/>
+          </p:nvPr>
+        </p:nvSpPr>
+        <p:spPr/>
+        <p:txBody>
+          <a:bodyPr/>
+          <a:lstStyle/>
+          <a:p>
+            <a:r>
+              <a:rPr lang="ro-RO" dirty="0" err="1"/>
+              <a:t>Application</a:t>
+            </a:r>
+            <a:r>
+              <a:rPr lang="ro-RO" dirty="0"/>
+              <a:t> </a:t>
+            </a:r>
+            <a:r>
+              <a:rPr lang="ro-RO" dirty="0" err="1"/>
+              <a:t>Insights</a:t>
+            </a:r>
+            <a:endParaRPr lang="ro-RO" dirty="0"/>
+          </a:p>
+        </p:txBody>
+      </p:sp>
+      <p:sp>
+        <p:nvSpPr>
+          <p:cNvPr id="4" name="Content Placeholder 3">
+            <a:extLst>
+              <a:ext uri="{FF2B5EF4-FFF2-40B4-BE49-F238E27FC236}">
+                <a16:creationId xmlns:a16="http://schemas.microsoft.com/office/drawing/2014/main" id="{9287F422-C2C4-4A53-B4A3-5927B1C5D6A8}"/>
+              </a:ext>
+            </a:extLst>
+          </p:cNvPr>
+          <p:cNvSpPr>
+            <a:spLocks noGrp="1"/>
+          </p:cNvSpPr>
+          <p:nvPr>
+            <p:ph idx="1"/>
+          </p:nvPr>
+        </p:nvSpPr>
+        <p:spPr/>
+        <p:txBody>
+          <a:bodyPr/>
+          <a:lstStyle/>
+          <a:p>
+            <a:r>
+              <a:rPr lang="en-US" dirty="0"/>
+              <a:t>Further reading: </a:t>
+            </a:r>
+            <a:r>
+              <a:rPr lang="en-US" dirty="0">
+                <a:hlinkClick r:id="rId2"/>
+              </a:rPr>
+              <a:t>What is Azure Application Insights? - Azure Monitor | Microsoft Docs</a:t>
+            </a:r>
+            <a:endParaRPr lang="ro-RO" dirty="0"/>
+          </a:p>
+        </p:txBody>
+      </p:sp>
+      <p:pic>
+        <p:nvPicPr>
+          <p:cNvPr id="1026" name="Picture 2" descr="Application Insights instrumentation in your app sends telemetry to your Application Insights resource.">
+            <a:extLst>
+              <a:ext uri="{FF2B5EF4-FFF2-40B4-BE49-F238E27FC236}">
+                <a16:creationId xmlns:a16="http://schemas.microsoft.com/office/drawing/2014/main" id="{685AF571-77A7-4725-9DBF-26B7D98D48C3}"/>
+              </a:ext>
+            </a:extLst>
+          </p:cNvPr>
+          <p:cNvPicPr>
+            <a:picLocks noChangeAspect="1" noChangeArrowheads="1"/>
+          </p:cNvPicPr>
+          <p:nvPr/>
+        </p:nvPicPr>
+        <p:blipFill>
+          <a:blip r:embed="rId3">
+            <a:extLst>
+              <a:ext uri="{28A0092B-C50C-407E-A947-70E740481C1C}">
+                <a14:useLocalDpi xmlns:a14="http://schemas.microsoft.com/office/drawing/2010/main" val="0"/>
+              </a:ext>
+            </a:extLst>
+          </a:blip>
+          <a:srcRect/>
+          <a:stretch>
+            <a:fillRect/>
+          </a:stretch>
+        </p:blipFill>
+        <p:spPr bwMode="auto">
+          <a:xfrm>
+            <a:off x="2476500" y="2377777"/>
+            <a:ext cx="7239000" cy="4219575"/>
+          </a:xfrm>
+          <a:prstGeom prst="rect">
+            <a:avLst/>
+          </a:prstGeom>
+          <a:noFill/>
+          <a:extLst>
+            <a:ext uri="{909E8E84-426E-40DD-AFC4-6F175D3DCCD1}">
+              <a14:hiddenFill xmlns:a14="http://schemas.microsoft.com/office/drawing/2010/main">
+                <a:solidFill>
+                  <a:srgbClr val="FFFFFF"/>
+                </a:solidFill>
+              </a14:hiddenFill>
+            </a:ext>
+          </a:extLst>
+        </p:spPr>
+      </p:pic>
+    </p:spTree>
+    <p:extLst>
+      <p:ext uri="{BB962C8B-B14F-4D97-AF65-F5344CB8AC3E}">
+        <p14:creationId xmlns:p14="http://schemas.microsoft.com/office/powerpoint/2010/main" val="243780330"/>
+      </p:ext>
+    </p:extLst>
+  </p:cSld>
+  <p:clrMapOvr>
+    <a:masterClrMapping/>
+  </p:clrMapOvr>
+  <mc:AlternateContent xmlns:mc="http://schemas.openxmlformats.org/markup-compatibility/2006" xmlns:p14="http://schemas.microsoft.com/office/powerpoint/2010/main">
+    <mc:Choice Requires="p14">
+      <p:transition spd="med" p14:dur="700">
+        <p:fade/>
+      </p:transition>
+    </mc:Choice>
+    <mc:Fallback xmlns="">
+      <p:transition spd="med">
+        <p:fade/>
+      </p:transition>
+    </mc:Fallback>
+  </mc:AlternateContent>
+</p:sld>
+</file>
+
+<file path=ppt/slides/slide14.xml><?xml version="1.0" encoding="utf-8"?>
+<p:sld xmlns:a="http://schemas.openxmlformats.org/drawingml/2006/main" xmlns:r="http://schemas.openxmlformats.org/officeDocument/2006/relationships" xmlns:p="http://schemas.openxmlformats.org/presentationml/2006/main">
+  <p:cSld>
+    <p:spTree>
+      <p:nvGrpSpPr>
+        <p:cNvPr id="1" name=""/>
+        <p:cNvGrpSpPr/>
+        <p:nvPr/>
+      </p:nvGrpSpPr>
+      <p:grpSpPr>
+        <a:xfrm>
+          <a:off x="0" y="0"/>
+          <a:ext cx="0" cy="0"/>
+          <a:chOff x="0" y="0"/>
+          <a:chExt cx="0" cy="0"/>
+        </a:xfrm>
+      </p:grpSpPr>
+      <p:sp>
+        <p:nvSpPr>
           <p:cNvPr id="4" name="Title 3"/>
           <p:cNvSpPr>
             <a:spLocks noGrp="1"/>

</xml_diff>